<commit_message>
slide de explícito e tácito
</commit_message>
<xml_diff>
--- a/PE/Estratégia e Conhecimento.pptx
+++ b/PE/Estratégia e Conhecimento.pptx
@@ -5,10 +5,10 @@
     <p:sldMasterId id="2147483726" r:id="rId2"/>
   </p:sldMasterIdLst>
   <p:notesMasterIdLst>
-    <p:notesMasterId r:id="rId24"/>
+    <p:notesMasterId r:id="rId25"/>
   </p:notesMasterIdLst>
   <p:handoutMasterIdLst>
-    <p:handoutMasterId r:id="rId25"/>
+    <p:handoutMasterId r:id="rId26"/>
   </p:handoutMasterIdLst>
   <p:sldIdLst>
     <p:sldId id="256" r:id="rId3"/>
@@ -16,22 +16,23 @@
     <p:sldId id="269" r:id="rId5"/>
     <p:sldId id="272" r:id="rId6"/>
     <p:sldId id="275" r:id="rId7"/>
-    <p:sldId id="273" r:id="rId8"/>
-    <p:sldId id="276" r:id="rId9"/>
-    <p:sldId id="278" r:id="rId10"/>
-    <p:sldId id="277" r:id="rId11"/>
-    <p:sldId id="280" r:id="rId12"/>
-    <p:sldId id="279" r:id="rId13"/>
-    <p:sldId id="281" r:id="rId14"/>
-    <p:sldId id="282" r:id="rId15"/>
-    <p:sldId id="283" r:id="rId16"/>
-    <p:sldId id="284" r:id="rId17"/>
-    <p:sldId id="285" r:id="rId18"/>
-    <p:sldId id="286" r:id="rId19"/>
-    <p:sldId id="287" r:id="rId20"/>
-    <p:sldId id="288" r:id="rId21"/>
-    <p:sldId id="289" r:id="rId22"/>
-    <p:sldId id="271" r:id="rId23"/>
+    <p:sldId id="290" r:id="rId8"/>
+    <p:sldId id="273" r:id="rId9"/>
+    <p:sldId id="276" r:id="rId10"/>
+    <p:sldId id="278" r:id="rId11"/>
+    <p:sldId id="277" r:id="rId12"/>
+    <p:sldId id="280" r:id="rId13"/>
+    <p:sldId id="279" r:id="rId14"/>
+    <p:sldId id="281" r:id="rId15"/>
+    <p:sldId id="282" r:id="rId16"/>
+    <p:sldId id="283" r:id="rId17"/>
+    <p:sldId id="284" r:id="rId18"/>
+    <p:sldId id="285" r:id="rId19"/>
+    <p:sldId id="286" r:id="rId20"/>
+    <p:sldId id="287" r:id="rId21"/>
+    <p:sldId id="288" r:id="rId22"/>
+    <p:sldId id="289" r:id="rId23"/>
+    <p:sldId id="271" r:id="rId24"/>
   </p:sldIdLst>
   <p:sldSz cx="12188825" cy="6858000"/>
   <p:notesSz cx="6858000" cy="9144000"/>
@@ -4217,10 +4218,39 @@
       </p:grpSpPr>
       <p:sp>
         <p:nvSpPr>
-          <p:cNvPr id="5" name="Título 4">
+          <p:cNvPr id="2" name="Título 1"/>
+          <p:cNvSpPr>
+            <a:spLocks noGrp="1"/>
+          </p:cNvSpPr>
+          <p:nvPr>
+            <p:ph type="title"/>
+          </p:nvPr>
+        </p:nvSpPr>
+        <p:spPr>
+          <a:xfrm>
+            <a:off x="1599783" y="2119056"/>
+            <a:ext cx="8989258" cy="2619888"/>
+          </a:xfrm>
+        </p:spPr>
+        <p:txBody>
+          <a:bodyPr>
+            <a:normAutofit fontScale="90000"/>
+          </a:bodyPr>
+          <a:lstStyle/>
+          <a:p>
+            <a:r>
+              <a:rPr lang="pt-BR" sz="4800" dirty="0"/>
+              <a:t>Competição, Inovação e Estratégias em Ambientes de Rápidas Mudanças Tecnológicas.</a:t>
+            </a:r>
+          </a:p>
+        </p:txBody>
+      </p:sp>
+      <p:sp>
+        <p:nvSpPr>
+          <p:cNvPr id="4" name="Espaço Reservado para Texto 3">
             <a:extLst>
               <a:ext uri="{FF2B5EF4-FFF2-40B4-BE49-F238E27FC236}">
-                <a16:creationId xmlns:a16="http://schemas.microsoft.com/office/drawing/2014/main" id="{9E95371D-4080-4EA1-A2C6-539307909D62}"/>
+                <a16:creationId xmlns:a16="http://schemas.microsoft.com/office/drawing/2014/main" id="{972A732D-796C-4F64-9E00-184BD54F7C4E}"/>
               </a:ext>
             </a:extLst>
           </p:cNvPr>
@@ -4228,32 +4258,7 @@
             <a:spLocks noGrp="1"/>
           </p:cNvSpPr>
           <p:nvPr>
-            <p:ph type="title"/>
-          </p:nvPr>
-        </p:nvSpPr>
-        <p:spPr/>
-        <p:txBody>
-          <a:bodyPr/>
-          <a:lstStyle/>
-          <a:p>
-            <a:endParaRPr lang="pt-BR"/>
-          </a:p>
-        </p:txBody>
-      </p:sp>
-      <p:sp>
-        <p:nvSpPr>
-          <p:cNvPr id="6" name="Espaço Reservado para Conteúdo 5">
-            <a:extLst>
-              <a:ext uri="{FF2B5EF4-FFF2-40B4-BE49-F238E27FC236}">
-                <a16:creationId xmlns:a16="http://schemas.microsoft.com/office/drawing/2014/main" id="{54271A5E-7F16-4F9D-A193-8FCA1A6F0565}"/>
-              </a:ext>
-            </a:extLst>
-          </p:cNvPr>
-          <p:cNvSpPr>
-            <a:spLocks noGrp="1"/>
-          </p:cNvSpPr>
-          <p:nvPr>
-            <p:ph idx="1"/>
+            <p:ph type="body" idx="1"/>
           </p:nvPr>
         </p:nvSpPr>
         <p:spPr/>
@@ -4268,7 +4273,7 @@
     </p:spTree>
     <p:extLst>
       <p:ext uri="{BB962C8B-B14F-4D97-AF65-F5344CB8AC3E}">
-        <p14:creationId xmlns:p14="http://schemas.microsoft.com/office/powerpoint/2010/main" val="2809868198"/>
+        <p14:creationId xmlns:p14="http://schemas.microsoft.com/office/powerpoint/2010/main" val="3388181005"/>
       </p:ext>
     </p:extLst>
   </p:cSld>
@@ -4309,41 +4314,10 @@
       </p:grpSpPr>
       <p:sp>
         <p:nvSpPr>
-          <p:cNvPr id="2" name="Título 1"/>
-          <p:cNvSpPr>
-            <a:spLocks noGrp="1"/>
-          </p:cNvSpPr>
-          <p:nvPr>
-            <p:ph type="title"/>
-          </p:nvPr>
-        </p:nvSpPr>
-        <p:spPr/>
-        <p:txBody>
-          <a:bodyPr/>
-          <a:lstStyle/>
-          <a:p>
-            <a:r>
-              <a:rPr lang="pt-BR" dirty="0" err="1"/>
-              <a:t>Dynamic</a:t>
-            </a:r>
-            <a:r>
-              <a:rPr lang="pt-BR" dirty="0"/>
-              <a:t> </a:t>
-            </a:r>
-            <a:r>
-              <a:rPr lang="pt-BR" dirty="0" err="1"/>
-              <a:t>Capabilities</a:t>
-            </a:r>
-            <a:endParaRPr lang="pt-BR" dirty="0"/>
-          </a:p>
-        </p:txBody>
-      </p:sp>
-      <p:sp>
-        <p:nvSpPr>
-          <p:cNvPr id="4" name="Espaço Reservado para Texto 3">
+          <p:cNvPr id="5" name="Título 4">
             <a:extLst>
               <a:ext uri="{FF2B5EF4-FFF2-40B4-BE49-F238E27FC236}">
-                <a16:creationId xmlns:a16="http://schemas.microsoft.com/office/drawing/2014/main" id="{B26531BA-3D22-4D64-A687-94B140806FD1}"/>
+                <a16:creationId xmlns:a16="http://schemas.microsoft.com/office/drawing/2014/main" id="{9E95371D-4080-4EA1-A2C6-539307909D62}"/>
               </a:ext>
             </a:extLst>
           </p:cNvPr>
@@ -4351,7 +4325,32 @@
             <a:spLocks noGrp="1"/>
           </p:cNvSpPr>
           <p:nvPr>
-            <p:ph type="body" idx="1"/>
+            <p:ph type="title"/>
+          </p:nvPr>
+        </p:nvSpPr>
+        <p:spPr/>
+        <p:txBody>
+          <a:bodyPr/>
+          <a:lstStyle/>
+          <a:p>
+            <a:endParaRPr lang="pt-BR"/>
+          </a:p>
+        </p:txBody>
+      </p:sp>
+      <p:sp>
+        <p:nvSpPr>
+          <p:cNvPr id="6" name="Espaço Reservado para Conteúdo 5">
+            <a:extLst>
+              <a:ext uri="{FF2B5EF4-FFF2-40B4-BE49-F238E27FC236}">
+                <a16:creationId xmlns:a16="http://schemas.microsoft.com/office/drawing/2014/main" id="{54271A5E-7F16-4F9D-A193-8FCA1A6F0565}"/>
+              </a:ext>
+            </a:extLst>
+          </p:cNvPr>
+          <p:cNvSpPr>
+            <a:spLocks noGrp="1"/>
+          </p:cNvSpPr>
+          <p:nvPr>
+            <p:ph idx="1"/>
           </p:nvPr>
         </p:nvSpPr>
         <p:spPr/>
@@ -4366,7 +4365,7 @@
     </p:spTree>
     <p:extLst>
       <p:ext uri="{BB962C8B-B14F-4D97-AF65-F5344CB8AC3E}">
-        <p14:creationId xmlns:p14="http://schemas.microsoft.com/office/powerpoint/2010/main" val="2095994215"/>
+        <p14:creationId xmlns:p14="http://schemas.microsoft.com/office/powerpoint/2010/main" val="2809868198"/>
       </p:ext>
     </p:extLst>
   </p:cSld>
@@ -4407,10 +4406,41 @@
       </p:grpSpPr>
       <p:sp>
         <p:nvSpPr>
-          <p:cNvPr id="5" name="Título 4">
+          <p:cNvPr id="2" name="Título 1"/>
+          <p:cNvSpPr>
+            <a:spLocks noGrp="1"/>
+          </p:cNvSpPr>
+          <p:nvPr>
+            <p:ph type="title"/>
+          </p:nvPr>
+        </p:nvSpPr>
+        <p:spPr/>
+        <p:txBody>
+          <a:bodyPr/>
+          <a:lstStyle/>
+          <a:p>
+            <a:r>
+              <a:rPr lang="pt-BR" dirty="0" err="1"/>
+              <a:t>Dynamic</a:t>
+            </a:r>
+            <a:r>
+              <a:rPr lang="pt-BR" dirty="0"/>
+              <a:t> </a:t>
+            </a:r>
+            <a:r>
+              <a:rPr lang="pt-BR" dirty="0" err="1"/>
+              <a:t>Capabilities</a:t>
+            </a:r>
+            <a:endParaRPr lang="pt-BR" dirty="0"/>
+          </a:p>
+        </p:txBody>
+      </p:sp>
+      <p:sp>
+        <p:nvSpPr>
+          <p:cNvPr id="4" name="Espaço Reservado para Texto 3">
             <a:extLst>
               <a:ext uri="{FF2B5EF4-FFF2-40B4-BE49-F238E27FC236}">
-                <a16:creationId xmlns:a16="http://schemas.microsoft.com/office/drawing/2014/main" id="{ADC3FC34-426C-4BDA-A14C-29B0FB5D08A4}"/>
+                <a16:creationId xmlns:a16="http://schemas.microsoft.com/office/drawing/2014/main" id="{B26531BA-3D22-4D64-A687-94B140806FD1}"/>
               </a:ext>
             </a:extLst>
           </p:cNvPr>
@@ -4418,32 +4448,7 @@
             <a:spLocks noGrp="1"/>
           </p:cNvSpPr>
           <p:nvPr>
-            <p:ph type="title"/>
-          </p:nvPr>
-        </p:nvSpPr>
-        <p:spPr/>
-        <p:txBody>
-          <a:bodyPr/>
-          <a:lstStyle/>
-          <a:p>
-            <a:endParaRPr lang="pt-BR"/>
-          </a:p>
-        </p:txBody>
-      </p:sp>
-      <p:sp>
-        <p:nvSpPr>
-          <p:cNvPr id="6" name="Espaço Reservado para Conteúdo 5">
-            <a:extLst>
-              <a:ext uri="{FF2B5EF4-FFF2-40B4-BE49-F238E27FC236}">
-                <a16:creationId xmlns:a16="http://schemas.microsoft.com/office/drawing/2014/main" id="{FB6E8C49-4C28-43F7-B9BD-CFF064DD1C01}"/>
-              </a:ext>
-            </a:extLst>
-          </p:cNvPr>
-          <p:cNvSpPr>
-            <a:spLocks noGrp="1"/>
-          </p:cNvSpPr>
-          <p:nvPr>
-            <p:ph idx="1"/>
+            <p:ph type="body" idx="1"/>
           </p:nvPr>
         </p:nvSpPr>
         <p:spPr/>
@@ -4458,7 +4463,7 @@
     </p:spTree>
     <p:extLst>
       <p:ext uri="{BB962C8B-B14F-4D97-AF65-F5344CB8AC3E}">
-        <p14:creationId xmlns:p14="http://schemas.microsoft.com/office/powerpoint/2010/main" val="912073054"/>
+        <p14:creationId xmlns:p14="http://schemas.microsoft.com/office/powerpoint/2010/main" val="2095994215"/>
       </p:ext>
     </p:extLst>
   </p:cSld>
@@ -4499,39 +4504,10 @@
       </p:grpSpPr>
       <p:sp>
         <p:nvSpPr>
-          <p:cNvPr id="2" name="Título 1"/>
-          <p:cNvSpPr>
-            <a:spLocks noGrp="1"/>
-          </p:cNvSpPr>
-          <p:nvPr>
-            <p:ph type="title"/>
-          </p:nvPr>
-        </p:nvSpPr>
-        <p:spPr/>
-        <p:txBody>
-          <a:bodyPr>
-            <a:normAutofit/>
-          </a:bodyPr>
-          <a:lstStyle/>
-          <a:p>
-            <a:r>
-              <a:rPr lang="pt-BR" dirty="0"/>
-              <a:t>Transferência de Know-how </a:t>
-            </a:r>
-            <a:r>
-              <a:rPr lang="pt-BR" dirty="0" err="1"/>
-              <a:t>Interfirmas</a:t>
-            </a:r>
-            <a:endParaRPr lang="pt-BR" dirty="0"/>
-          </a:p>
-        </p:txBody>
-      </p:sp>
-      <p:sp>
-        <p:nvSpPr>
-          <p:cNvPr id="4" name="Espaço Reservado para Texto 3">
+          <p:cNvPr id="5" name="Título 4">
             <a:extLst>
               <a:ext uri="{FF2B5EF4-FFF2-40B4-BE49-F238E27FC236}">
-                <a16:creationId xmlns:a16="http://schemas.microsoft.com/office/drawing/2014/main" id="{2B93A870-8593-443D-9510-45D6BF4D7805}"/>
+                <a16:creationId xmlns:a16="http://schemas.microsoft.com/office/drawing/2014/main" id="{ADC3FC34-426C-4BDA-A14C-29B0FB5D08A4}"/>
               </a:ext>
             </a:extLst>
           </p:cNvPr>
@@ -4539,7 +4515,32 @@
             <a:spLocks noGrp="1"/>
           </p:cNvSpPr>
           <p:nvPr>
-            <p:ph type="body" idx="1"/>
+            <p:ph type="title"/>
+          </p:nvPr>
+        </p:nvSpPr>
+        <p:spPr/>
+        <p:txBody>
+          <a:bodyPr/>
+          <a:lstStyle/>
+          <a:p>
+            <a:endParaRPr lang="pt-BR"/>
+          </a:p>
+        </p:txBody>
+      </p:sp>
+      <p:sp>
+        <p:nvSpPr>
+          <p:cNvPr id="6" name="Espaço Reservado para Conteúdo 5">
+            <a:extLst>
+              <a:ext uri="{FF2B5EF4-FFF2-40B4-BE49-F238E27FC236}">
+                <a16:creationId xmlns:a16="http://schemas.microsoft.com/office/drawing/2014/main" id="{FB6E8C49-4C28-43F7-B9BD-CFF064DD1C01}"/>
+              </a:ext>
+            </a:extLst>
+          </p:cNvPr>
+          <p:cNvSpPr>
+            <a:spLocks noGrp="1"/>
+          </p:cNvSpPr>
+          <p:nvPr>
+            <p:ph idx="1"/>
           </p:nvPr>
         </p:nvSpPr>
         <p:spPr/>
@@ -4554,7 +4555,7 @@
     </p:spTree>
     <p:extLst>
       <p:ext uri="{BB962C8B-B14F-4D97-AF65-F5344CB8AC3E}">
-        <p14:creationId xmlns:p14="http://schemas.microsoft.com/office/powerpoint/2010/main" val="1809858401"/>
+        <p14:creationId xmlns:p14="http://schemas.microsoft.com/office/powerpoint/2010/main" val="912073054"/>
       </p:ext>
     </p:extLst>
   </p:cSld>
@@ -4595,10 +4596,39 @@
       </p:grpSpPr>
       <p:sp>
         <p:nvSpPr>
-          <p:cNvPr id="6" name="Título 5">
+          <p:cNvPr id="2" name="Título 1"/>
+          <p:cNvSpPr>
+            <a:spLocks noGrp="1"/>
+          </p:cNvSpPr>
+          <p:nvPr>
+            <p:ph type="title"/>
+          </p:nvPr>
+        </p:nvSpPr>
+        <p:spPr/>
+        <p:txBody>
+          <a:bodyPr>
+            <a:normAutofit/>
+          </a:bodyPr>
+          <a:lstStyle/>
+          <a:p>
+            <a:r>
+              <a:rPr lang="pt-BR" dirty="0"/>
+              <a:t>Transferência de Know-how </a:t>
+            </a:r>
+            <a:r>
+              <a:rPr lang="pt-BR" dirty="0" err="1"/>
+              <a:t>Interfirmas</a:t>
+            </a:r>
+            <a:endParaRPr lang="pt-BR" dirty="0"/>
+          </a:p>
+        </p:txBody>
+      </p:sp>
+      <p:sp>
+        <p:nvSpPr>
+          <p:cNvPr id="4" name="Espaço Reservado para Texto 3">
             <a:extLst>
               <a:ext uri="{FF2B5EF4-FFF2-40B4-BE49-F238E27FC236}">
-                <a16:creationId xmlns:a16="http://schemas.microsoft.com/office/drawing/2014/main" id="{E7F9521D-5970-410D-B255-BD5CCF98289B}"/>
+                <a16:creationId xmlns:a16="http://schemas.microsoft.com/office/drawing/2014/main" id="{2B93A870-8593-443D-9510-45D6BF4D7805}"/>
               </a:ext>
             </a:extLst>
           </p:cNvPr>
@@ -4606,32 +4636,7 @@
             <a:spLocks noGrp="1"/>
           </p:cNvSpPr>
           <p:nvPr>
-            <p:ph type="title"/>
-          </p:nvPr>
-        </p:nvSpPr>
-        <p:spPr/>
-        <p:txBody>
-          <a:bodyPr/>
-          <a:lstStyle/>
-          <a:p>
-            <a:endParaRPr lang="pt-BR"/>
-          </a:p>
-        </p:txBody>
-      </p:sp>
-      <p:sp>
-        <p:nvSpPr>
-          <p:cNvPr id="7" name="Espaço Reservado para Conteúdo 6">
-            <a:extLst>
-              <a:ext uri="{FF2B5EF4-FFF2-40B4-BE49-F238E27FC236}">
-                <a16:creationId xmlns:a16="http://schemas.microsoft.com/office/drawing/2014/main" id="{EF53658C-9761-4195-82A6-4D897EE440DF}"/>
-              </a:ext>
-            </a:extLst>
-          </p:cNvPr>
-          <p:cNvSpPr>
-            <a:spLocks noGrp="1"/>
-          </p:cNvSpPr>
-          <p:nvPr>
-            <p:ph idx="1"/>
+            <p:ph type="body" idx="1"/>
           </p:nvPr>
         </p:nvSpPr>
         <p:spPr/>
@@ -4646,7 +4651,7 @@
     </p:spTree>
     <p:extLst>
       <p:ext uri="{BB962C8B-B14F-4D97-AF65-F5344CB8AC3E}">
-        <p14:creationId xmlns:p14="http://schemas.microsoft.com/office/powerpoint/2010/main" val="168266997"/>
+        <p14:creationId xmlns:p14="http://schemas.microsoft.com/office/powerpoint/2010/main" val="1809858401"/>
       </p:ext>
     </p:extLst>
   </p:cSld>
@@ -4687,39 +4692,10 @@
       </p:grpSpPr>
       <p:sp>
         <p:nvSpPr>
-          <p:cNvPr id="2" name="Título 1"/>
-          <p:cNvSpPr>
-            <a:spLocks noGrp="1"/>
-          </p:cNvSpPr>
-          <p:nvPr>
-            <p:ph type="title"/>
-          </p:nvPr>
-        </p:nvSpPr>
-        <p:spPr>
-          <a:xfrm>
-            <a:off x="1599783" y="2047048"/>
-            <a:ext cx="8989258" cy="2763904"/>
-          </a:xfrm>
-        </p:spPr>
-        <p:txBody>
-          <a:bodyPr>
-            <a:normAutofit fontScale="90000"/>
-          </a:bodyPr>
-          <a:lstStyle/>
-          <a:p>
-            <a:r>
-              <a:rPr lang="pt-BR" dirty="0"/>
-              <a:t>Fatores Culturais e Seus Efeitos na Implementação do Aprendizado e Multiplicadores  do Conhecimento nas Organizações</a:t>
-            </a:r>
-          </a:p>
-        </p:txBody>
-      </p:sp>
-      <p:sp>
-        <p:nvSpPr>
-          <p:cNvPr id="4" name="Espaço Reservado para Texto 3">
+          <p:cNvPr id="6" name="Título 5">
             <a:extLst>
               <a:ext uri="{FF2B5EF4-FFF2-40B4-BE49-F238E27FC236}">
-                <a16:creationId xmlns:a16="http://schemas.microsoft.com/office/drawing/2014/main" id="{AA0F8557-D72E-4E72-B278-26B6C49CDC1B}"/>
+                <a16:creationId xmlns:a16="http://schemas.microsoft.com/office/drawing/2014/main" id="{E7F9521D-5970-410D-B255-BD5CCF98289B}"/>
               </a:ext>
             </a:extLst>
           </p:cNvPr>
@@ -4727,7 +4703,32 @@
             <a:spLocks noGrp="1"/>
           </p:cNvSpPr>
           <p:nvPr>
-            <p:ph type="body" idx="1"/>
+            <p:ph type="title"/>
+          </p:nvPr>
+        </p:nvSpPr>
+        <p:spPr/>
+        <p:txBody>
+          <a:bodyPr/>
+          <a:lstStyle/>
+          <a:p>
+            <a:endParaRPr lang="pt-BR"/>
+          </a:p>
+        </p:txBody>
+      </p:sp>
+      <p:sp>
+        <p:nvSpPr>
+          <p:cNvPr id="7" name="Espaço Reservado para Conteúdo 6">
+            <a:extLst>
+              <a:ext uri="{FF2B5EF4-FFF2-40B4-BE49-F238E27FC236}">
+                <a16:creationId xmlns:a16="http://schemas.microsoft.com/office/drawing/2014/main" id="{EF53658C-9761-4195-82A6-4D897EE440DF}"/>
+              </a:ext>
+            </a:extLst>
+          </p:cNvPr>
+          <p:cNvSpPr>
+            <a:spLocks noGrp="1"/>
+          </p:cNvSpPr>
+          <p:nvPr>
+            <p:ph idx="1"/>
           </p:nvPr>
         </p:nvSpPr>
         <p:spPr/>
@@ -4742,7 +4743,7 @@
     </p:spTree>
     <p:extLst>
       <p:ext uri="{BB962C8B-B14F-4D97-AF65-F5344CB8AC3E}">
-        <p14:creationId xmlns:p14="http://schemas.microsoft.com/office/powerpoint/2010/main" val="3390421571"/>
+        <p14:creationId xmlns:p14="http://schemas.microsoft.com/office/powerpoint/2010/main" val="168266997"/>
       </p:ext>
     </p:extLst>
   </p:cSld>
@@ -4783,10 +4784,39 @@
       </p:grpSpPr>
       <p:sp>
         <p:nvSpPr>
-          <p:cNvPr id="5" name="Título 4">
+          <p:cNvPr id="2" name="Título 1"/>
+          <p:cNvSpPr>
+            <a:spLocks noGrp="1"/>
+          </p:cNvSpPr>
+          <p:nvPr>
+            <p:ph type="title"/>
+          </p:nvPr>
+        </p:nvSpPr>
+        <p:spPr>
+          <a:xfrm>
+            <a:off x="1599783" y="2047048"/>
+            <a:ext cx="8989258" cy="2763904"/>
+          </a:xfrm>
+        </p:spPr>
+        <p:txBody>
+          <a:bodyPr>
+            <a:normAutofit fontScale="90000"/>
+          </a:bodyPr>
+          <a:lstStyle/>
+          <a:p>
+            <a:r>
+              <a:rPr lang="pt-BR" dirty="0"/>
+              <a:t>Fatores Culturais e Seus Efeitos na Implementação do Aprendizado e Multiplicadores  do Conhecimento nas Organizações</a:t>
+            </a:r>
+          </a:p>
+        </p:txBody>
+      </p:sp>
+      <p:sp>
+        <p:nvSpPr>
+          <p:cNvPr id="4" name="Espaço Reservado para Texto 3">
             <a:extLst>
               <a:ext uri="{FF2B5EF4-FFF2-40B4-BE49-F238E27FC236}">
-                <a16:creationId xmlns:a16="http://schemas.microsoft.com/office/drawing/2014/main" id="{F6C92CFF-A611-40A1-80D9-DA7D6D4E5FCA}"/>
+                <a16:creationId xmlns:a16="http://schemas.microsoft.com/office/drawing/2014/main" id="{AA0F8557-D72E-4E72-B278-26B6C49CDC1B}"/>
               </a:ext>
             </a:extLst>
           </p:cNvPr>
@@ -4794,32 +4824,7 @@
             <a:spLocks noGrp="1"/>
           </p:cNvSpPr>
           <p:nvPr>
-            <p:ph type="title"/>
-          </p:nvPr>
-        </p:nvSpPr>
-        <p:spPr/>
-        <p:txBody>
-          <a:bodyPr/>
-          <a:lstStyle/>
-          <a:p>
-            <a:endParaRPr lang="pt-BR"/>
-          </a:p>
-        </p:txBody>
-      </p:sp>
-      <p:sp>
-        <p:nvSpPr>
-          <p:cNvPr id="6" name="Espaço Reservado para Conteúdo 5">
-            <a:extLst>
-              <a:ext uri="{FF2B5EF4-FFF2-40B4-BE49-F238E27FC236}">
-                <a16:creationId xmlns:a16="http://schemas.microsoft.com/office/drawing/2014/main" id="{E28D1304-9858-4AB1-A67C-7DB90D5541BE}"/>
-              </a:ext>
-            </a:extLst>
-          </p:cNvPr>
-          <p:cNvSpPr>
-            <a:spLocks noGrp="1"/>
-          </p:cNvSpPr>
-          <p:nvPr>
-            <p:ph idx="1"/>
+            <p:ph type="body" idx="1"/>
           </p:nvPr>
         </p:nvSpPr>
         <p:spPr/>
@@ -4834,7 +4839,7 @@
     </p:spTree>
     <p:extLst>
       <p:ext uri="{BB962C8B-B14F-4D97-AF65-F5344CB8AC3E}">
-        <p14:creationId xmlns:p14="http://schemas.microsoft.com/office/powerpoint/2010/main" val="46804557"/>
+        <p14:creationId xmlns:p14="http://schemas.microsoft.com/office/powerpoint/2010/main" val="3390421571"/>
       </p:ext>
     </p:extLst>
   </p:cSld>
@@ -4875,39 +4880,10 @@
       </p:grpSpPr>
       <p:sp>
         <p:nvSpPr>
-          <p:cNvPr id="2" name="Título 1"/>
-          <p:cNvSpPr>
-            <a:spLocks noGrp="1"/>
-          </p:cNvSpPr>
-          <p:nvPr>
-            <p:ph type="title"/>
-          </p:nvPr>
-        </p:nvSpPr>
-        <p:spPr>
-          <a:xfrm>
-            <a:off x="1599783" y="2606040"/>
-            <a:ext cx="8989258" cy="1645920"/>
-          </a:xfrm>
-        </p:spPr>
-        <p:txBody>
-          <a:bodyPr>
-            <a:normAutofit fontScale="90000"/>
-          </a:bodyPr>
-          <a:lstStyle/>
-          <a:p>
-            <a:r>
-              <a:rPr lang="pt-BR" dirty="0"/>
-              <a:t>Aquisição, Desenvolvimento, Transferência e Replicação do Conhecimento</a:t>
-            </a:r>
-          </a:p>
-        </p:txBody>
-      </p:sp>
-      <p:sp>
-        <p:nvSpPr>
-          <p:cNvPr id="4" name="Espaço Reservado para Texto 3">
+          <p:cNvPr id="5" name="Título 4">
             <a:extLst>
               <a:ext uri="{FF2B5EF4-FFF2-40B4-BE49-F238E27FC236}">
-                <a16:creationId xmlns:a16="http://schemas.microsoft.com/office/drawing/2014/main" id="{A21F4B07-51E7-4B8F-9469-82E66FEFDA89}"/>
+                <a16:creationId xmlns:a16="http://schemas.microsoft.com/office/drawing/2014/main" id="{F6C92CFF-A611-40A1-80D9-DA7D6D4E5FCA}"/>
               </a:ext>
             </a:extLst>
           </p:cNvPr>
@@ -4915,7 +4891,32 @@
             <a:spLocks noGrp="1"/>
           </p:cNvSpPr>
           <p:nvPr>
-            <p:ph type="body" idx="1"/>
+            <p:ph type="title"/>
+          </p:nvPr>
+        </p:nvSpPr>
+        <p:spPr/>
+        <p:txBody>
+          <a:bodyPr/>
+          <a:lstStyle/>
+          <a:p>
+            <a:endParaRPr lang="pt-BR"/>
+          </a:p>
+        </p:txBody>
+      </p:sp>
+      <p:sp>
+        <p:nvSpPr>
+          <p:cNvPr id="6" name="Espaço Reservado para Conteúdo 5">
+            <a:extLst>
+              <a:ext uri="{FF2B5EF4-FFF2-40B4-BE49-F238E27FC236}">
+                <a16:creationId xmlns:a16="http://schemas.microsoft.com/office/drawing/2014/main" id="{E28D1304-9858-4AB1-A67C-7DB90D5541BE}"/>
+              </a:ext>
+            </a:extLst>
+          </p:cNvPr>
+          <p:cNvSpPr>
+            <a:spLocks noGrp="1"/>
+          </p:cNvSpPr>
+          <p:nvPr>
+            <p:ph idx="1"/>
           </p:nvPr>
         </p:nvSpPr>
         <p:spPr/>
@@ -4930,7 +4931,7 @@
     </p:spTree>
     <p:extLst>
       <p:ext uri="{BB962C8B-B14F-4D97-AF65-F5344CB8AC3E}">
-        <p14:creationId xmlns:p14="http://schemas.microsoft.com/office/powerpoint/2010/main" val="769444684"/>
+        <p14:creationId xmlns:p14="http://schemas.microsoft.com/office/powerpoint/2010/main" val="46804557"/>
       </p:ext>
     </p:extLst>
   </p:cSld>
@@ -4971,10 +4972,39 @@
       </p:grpSpPr>
       <p:sp>
         <p:nvSpPr>
-          <p:cNvPr id="5" name="Título 4">
+          <p:cNvPr id="2" name="Título 1"/>
+          <p:cNvSpPr>
+            <a:spLocks noGrp="1"/>
+          </p:cNvSpPr>
+          <p:nvPr>
+            <p:ph type="title"/>
+          </p:nvPr>
+        </p:nvSpPr>
+        <p:spPr>
+          <a:xfrm>
+            <a:off x="1599783" y="2606040"/>
+            <a:ext cx="8989258" cy="1645920"/>
+          </a:xfrm>
+        </p:spPr>
+        <p:txBody>
+          <a:bodyPr>
+            <a:normAutofit fontScale="90000"/>
+          </a:bodyPr>
+          <a:lstStyle/>
+          <a:p>
+            <a:r>
+              <a:rPr lang="pt-BR" dirty="0"/>
+              <a:t>Aquisição, Desenvolvimento, Transferência e Replicação do Conhecimento</a:t>
+            </a:r>
+          </a:p>
+        </p:txBody>
+      </p:sp>
+      <p:sp>
+        <p:nvSpPr>
+          <p:cNvPr id="4" name="Espaço Reservado para Texto 3">
             <a:extLst>
               <a:ext uri="{FF2B5EF4-FFF2-40B4-BE49-F238E27FC236}">
-                <a16:creationId xmlns:a16="http://schemas.microsoft.com/office/drawing/2014/main" id="{F0A4355B-DD85-4C87-AF00-C57DA87B8DAA}"/>
+                <a16:creationId xmlns:a16="http://schemas.microsoft.com/office/drawing/2014/main" id="{A21F4B07-51E7-4B8F-9469-82E66FEFDA89}"/>
               </a:ext>
             </a:extLst>
           </p:cNvPr>
@@ -4982,32 +5012,7 @@
             <a:spLocks noGrp="1"/>
           </p:cNvSpPr>
           <p:nvPr>
-            <p:ph type="title"/>
-          </p:nvPr>
-        </p:nvSpPr>
-        <p:spPr/>
-        <p:txBody>
-          <a:bodyPr/>
-          <a:lstStyle/>
-          <a:p>
-            <a:endParaRPr lang="pt-BR"/>
-          </a:p>
-        </p:txBody>
-      </p:sp>
-      <p:sp>
-        <p:nvSpPr>
-          <p:cNvPr id="6" name="Espaço Reservado para Conteúdo 5">
-            <a:extLst>
-              <a:ext uri="{FF2B5EF4-FFF2-40B4-BE49-F238E27FC236}">
-                <a16:creationId xmlns:a16="http://schemas.microsoft.com/office/drawing/2014/main" id="{4846FE91-C079-4761-B17B-84E7B379560D}"/>
-              </a:ext>
-            </a:extLst>
-          </p:cNvPr>
-          <p:cNvSpPr>
-            <a:spLocks noGrp="1"/>
-          </p:cNvSpPr>
-          <p:nvPr>
-            <p:ph idx="1"/>
+            <p:ph type="body" idx="1"/>
           </p:nvPr>
         </p:nvSpPr>
         <p:spPr/>
@@ -5022,7 +5027,7 @@
     </p:spTree>
     <p:extLst>
       <p:ext uri="{BB962C8B-B14F-4D97-AF65-F5344CB8AC3E}">
-        <p14:creationId xmlns:p14="http://schemas.microsoft.com/office/powerpoint/2010/main" val="1252417425"/>
+        <p14:creationId xmlns:p14="http://schemas.microsoft.com/office/powerpoint/2010/main" val="769444684"/>
       </p:ext>
     </p:extLst>
   </p:cSld>
@@ -5063,48 +5068,10 @@
       </p:grpSpPr>
       <p:sp>
         <p:nvSpPr>
-          <p:cNvPr id="2" name="Título 1"/>
-          <p:cNvSpPr>
-            <a:spLocks noGrp="1"/>
-          </p:cNvSpPr>
-          <p:nvPr>
-            <p:ph type="title"/>
-          </p:nvPr>
-        </p:nvSpPr>
-        <p:spPr>
-          <a:xfrm>
-            <a:off x="1599783" y="2606040"/>
-            <a:ext cx="8989258" cy="1645920"/>
-          </a:xfrm>
-        </p:spPr>
-        <p:txBody>
-          <a:bodyPr>
-            <a:normAutofit/>
-          </a:bodyPr>
-          <a:lstStyle/>
-          <a:p>
-            <a:r>
-              <a:rPr lang="en-US" dirty="0"/>
-              <a:t>Exploration, </a:t>
-            </a:r>
-            <a:r>
-              <a:rPr lang="en-US" dirty="0" err="1"/>
-              <a:t>Explotation</a:t>
-            </a:r>
-            <a:r>
-              <a:rPr lang="en-US" dirty="0"/>
-              <a:t> e Path Dependency.</a:t>
-            </a:r>
-            <a:endParaRPr lang="pt-BR" dirty="0"/>
-          </a:p>
-        </p:txBody>
-      </p:sp>
-      <p:sp>
-        <p:nvSpPr>
-          <p:cNvPr id="4" name="Espaço Reservado para Texto 3">
+          <p:cNvPr id="5" name="Título 4">
             <a:extLst>
               <a:ext uri="{FF2B5EF4-FFF2-40B4-BE49-F238E27FC236}">
-                <a16:creationId xmlns:a16="http://schemas.microsoft.com/office/drawing/2014/main" id="{3B8FE13F-9912-4FC3-B909-5A2F8BA72850}"/>
+                <a16:creationId xmlns:a16="http://schemas.microsoft.com/office/drawing/2014/main" id="{F0A4355B-DD85-4C87-AF00-C57DA87B8DAA}"/>
               </a:ext>
             </a:extLst>
           </p:cNvPr>
@@ -5112,7 +5079,32 @@
             <a:spLocks noGrp="1"/>
           </p:cNvSpPr>
           <p:nvPr>
-            <p:ph type="body" idx="1"/>
+            <p:ph type="title"/>
+          </p:nvPr>
+        </p:nvSpPr>
+        <p:spPr/>
+        <p:txBody>
+          <a:bodyPr/>
+          <a:lstStyle/>
+          <a:p>
+            <a:endParaRPr lang="pt-BR"/>
+          </a:p>
+        </p:txBody>
+      </p:sp>
+      <p:sp>
+        <p:nvSpPr>
+          <p:cNvPr id="6" name="Espaço Reservado para Conteúdo 5">
+            <a:extLst>
+              <a:ext uri="{FF2B5EF4-FFF2-40B4-BE49-F238E27FC236}">
+                <a16:creationId xmlns:a16="http://schemas.microsoft.com/office/drawing/2014/main" id="{4846FE91-C079-4761-B17B-84E7B379560D}"/>
+              </a:ext>
+            </a:extLst>
+          </p:cNvPr>
+          <p:cNvSpPr>
+            <a:spLocks noGrp="1"/>
+          </p:cNvSpPr>
+          <p:nvPr>
+            <p:ph idx="1"/>
           </p:nvPr>
         </p:nvSpPr>
         <p:spPr/>
@@ -5127,7 +5119,7 @@
     </p:spTree>
     <p:extLst>
       <p:ext uri="{BB962C8B-B14F-4D97-AF65-F5344CB8AC3E}">
-        <p14:creationId xmlns:p14="http://schemas.microsoft.com/office/powerpoint/2010/main" val="1192054470"/>
+        <p14:creationId xmlns:p14="http://schemas.microsoft.com/office/powerpoint/2010/main" val="1252417425"/>
       </p:ext>
     </p:extLst>
   </p:cSld>
@@ -5521,6 +5513,111 @@
       </p:grpSpPr>
       <p:sp>
         <p:nvSpPr>
+          <p:cNvPr id="2" name="Título 1"/>
+          <p:cNvSpPr>
+            <a:spLocks noGrp="1"/>
+          </p:cNvSpPr>
+          <p:nvPr>
+            <p:ph type="title"/>
+          </p:nvPr>
+        </p:nvSpPr>
+        <p:spPr>
+          <a:xfrm>
+            <a:off x="1599783" y="2606040"/>
+            <a:ext cx="8989258" cy="1645920"/>
+          </a:xfrm>
+        </p:spPr>
+        <p:txBody>
+          <a:bodyPr>
+            <a:normAutofit/>
+          </a:bodyPr>
+          <a:lstStyle/>
+          <a:p>
+            <a:r>
+              <a:rPr lang="en-US" dirty="0"/>
+              <a:t>Exploration, </a:t>
+            </a:r>
+            <a:r>
+              <a:rPr lang="en-US" dirty="0" err="1"/>
+              <a:t>Explotation</a:t>
+            </a:r>
+            <a:r>
+              <a:rPr lang="en-US" dirty="0"/>
+              <a:t> e Path Dependency.</a:t>
+            </a:r>
+            <a:endParaRPr lang="pt-BR" dirty="0"/>
+          </a:p>
+        </p:txBody>
+      </p:sp>
+      <p:sp>
+        <p:nvSpPr>
+          <p:cNvPr id="4" name="Espaço Reservado para Texto 3">
+            <a:extLst>
+              <a:ext uri="{FF2B5EF4-FFF2-40B4-BE49-F238E27FC236}">
+                <a16:creationId xmlns:a16="http://schemas.microsoft.com/office/drawing/2014/main" id="{3B8FE13F-9912-4FC3-B909-5A2F8BA72850}"/>
+              </a:ext>
+            </a:extLst>
+          </p:cNvPr>
+          <p:cNvSpPr>
+            <a:spLocks noGrp="1"/>
+          </p:cNvSpPr>
+          <p:nvPr>
+            <p:ph type="body" idx="1"/>
+          </p:nvPr>
+        </p:nvSpPr>
+        <p:spPr/>
+        <p:txBody>
+          <a:bodyPr/>
+          <a:lstStyle/>
+          <a:p>
+            <a:endParaRPr lang="pt-BR"/>
+          </a:p>
+        </p:txBody>
+      </p:sp>
+    </p:spTree>
+    <p:extLst>
+      <p:ext uri="{BB962C8B-B14F-4D97-AF65-F5344CB8AC3E}">
+        <p14:creationId xmlns:p14="http://schemas.microsoft.com/office/powerpoint/2010/main" val="1192054470"/>
+      </p:ext>
+    </p:extLst>
+  </p:cSld>
+  <p:clrMapOvr>
+    <a:masterClrMapping/>
+  </p:clrMapOvr>
+  <mc:AlternateContent xmlns:mc="http://schemas.openxmlformats.org/markup-compatibility/2006" xmlns:p14="http://schemas.microsoft.com/office/powerpoint/2010/main">
+    <mc:Choice Requires="p14">
+      <p:transition spd="med" p14:dur="700">
+        <p:fade/>
+      </p:transition>
+    </mc:Choice>
+    <mc:Fallback xmlns="">
+      <p:transition spd="med">
+        <p:fade/>
+      </p:transition>
+    </mc:Fallback>
+  </mc:AlternateContent>
+</p:sld>
+</file>
+
+<file path=ppt/slides/slide21.xml><?xml version="1.0" encoding="utf-8"?>
+<p:sld xmlns:a="http://schemas.openxmlformats.org/drawingml/2006/main" xmlns:r="http://schemas.openxmlformats.org/officeDocument/2006/relationships" xmlns:p="http://schemas.openxmlformats.org/presentationml/2006/main">
+  <p:cSld>
+    <p:spTree>
+      <p:nvGrpSpPr>
+        <p:cNvPr id="1" name=""/>
+        <p:cNvGrpSpPr/>
+        <p:nvPr/>
+      </p:nvGrpSpPr>
+      <p:grpSpPr>
+        <a:xfrm>
+          <a:off x="0" y="0"/>
+          <a:ext cx="0" cy="0"/>
+          <a:chOff x="0" y="0"/>
+          <a:chExt cx="0" cy="0"/>
+        </a:xfrm>
+      </p:grpSpPr>
+      <p:sp>
+        <p:nvSpPr>
           <p:cNvPr id="5" name="Título 4">
             <a:extLst>
               <a:ext uri="{FF2B5EF4-FFF2-40B4-BE49-F238E27FC236}">
@@ -5594,7 +5691,7 @@
 </p:sld>
 </file>
 
-<file path=ppt/slides/slide21.xml><?xml version="1.0" encoding="utf-8"?>
+<file path=ppt/slides/slide22.xml><?xml version="1.0" encoding="utf-8"?>
 <p:sld xmlns:a="http://schemas.openxmlformats.org/drawingml/2006/main" xmlns:r="http://schemas.openxmlformats.org/officeDocument/2006/relationships" xmlns:p="http://schemas.openxmlformats.org/presentationml/2006/main">
   <p:cSld>
     <p:spTree>
@@ -6025,80 +6122,97 @@
           <a:chExt cx="0" cy="0"/>
         </a:xfrm>
       </p:grpSpPr>
-      <p:pic>
-        <p:nvPicPr>
-          <p:cNvPr id="9" name="Espaço Reservado para Conteúdo 8">
+      <p:sp>
+        <p:nvSpPr>
+          <p:cNvPr id="4" name="Título 3">
             <a:extLst>
               <a:ext uri="{FF2B5EF4-FFF2-40B4-BE49-F238E27FC236}">
-                <a16:creationId xmlns:a16="http://schemas.microsoft.com/office/drawing/2014/main" id="{CC9DB16C-B653-4180-9657-D5A5FFF96D82}"/>
+                <a16:creationId xmlns:a16="http://schemas.microsoft.com/office/drawing/2014/main" id="{661E6DE8-95CA-4B23-B76C-30EC587D6066}"/>
               </a:ext>
             </a:extLst>
           </p:cNvPr>
-          <p:cNvPicPr>
-            <a:picLocks noGrp="1" noChangeAspect="1"/>
-          </p:cNvPicPr>
-          <p:nvPr>
-            <p:ph idx="1"/>
-          </p:nvPr>
-        </p:nvPicPr>
-        <p:blipFill>
-          <a:blip r:embed="rId2">
-            <a:extLst>
-              <a:ext uri="{28A0092B-C50C-407E-A947-70E740481C1C}">
-                <a14:useLocalDpi xmlns:a14="http://schemas.microsoft.com/office/drawing/2010/main" val="0"/>
-              </a:ext>
-            </a:extLst>
-          </a:blip>
-          <a:stretch>
-            <a:fillRect/>
-          </a:stretch>
-        </p:blipFill>
-        <p:spPr>
-          <a:xfrm>
-            <a:off x="2205980" y="156900"/>
-            <a:ext cx="7776864" cy="6544200"/>
-          </a:xfrm>
-          <a:effectLst>
-            <a:softEdge rad="12700"/>
-          </a:effectLst>
-        </p:spPr>
-      </p:pic>
-      <p:sp>
-        <p:nvSpPr>
-          <p:cNvPr id="10" name="CaixaDeTexto 9">
+          <p:cNvSpPr>
+            <a:spLocks noGrp="1"/>
+          </p:cNvSpPr>
+          <p:nvPr>
+            <p:ph type="title"/>
+          </p:nvPr>
+        </p:nvSpPr>
+        <p:spPr/>
+        <p:txBody>
+          <a:bodyPr/>
+          <a:lstStyle/>
+          <a:p>
+            <a:r>
+              <a:rPr lang="pt-BR" sz="2800" dirty="0"/>
+              <a:t>O explícito e o tácito</a:t>
+            </a:r>
+            <a:endParaRPr lang="pt-BR" dirty="0"/>
+          </a:p>
+        </p:txBody>
+      </p:sp>
+      <p:sp>
+        <p:nvSpPr>
+          <p:cNvPr id="5" name="Espaço Reservado para Conteúdo 4">
             <a:extLst>
               <a:ext uri="{FF2B5EF4-FFF2-40B4-BE49-F238E27FC236}">
-                <a16:creationId xmlns:a16="http://schemas.microsoft.com/office/drawing/2014/main" id="{44333704-4AE1-416B-A851-2767C4BAEB01}"/>
+                <a16:creationId xmlns:a16="http://schemas.microsoft.com/office/drawing/2014/main" id="{B61967B7-96A2-4F87-A210-A45F30325662}"/>
               </a:ext>
             </a:extLst>
           </p:cNvPr>
-          <p:cNvSpPr txBox="1"/>
-          <p:nvPr/>
+          <p:cNvSpPr>
+            <a:spLocks noGrp="1"/>
+          </p:cNvSpPr>
+          <p:nvPr>
+            <p:ph idx="1"/>
+          </p:nvPr>
         </p:nvSpPr>
         <p:spPr>
           <a:xfrm>
-            <a:off x="405780" y="692696"/>
-            <a:ext cx="3672408" cy="5472608"/>
+            <a:off x="2230555" y="2638045"/>
+            <a:ext cx="7320241" cy="3101983"/>
           </a:xfrm>
-          <a:prstGeom prst="rect">
-            <a:avLst/>
-          </a:prstGeom>
-          <a:noFill/>
         </p:spPr>
         <p:txBody>
-          <a:bodyPr wrap="square" rtlCol="0">
-            <a:spAutoFit/>
+          <a:bodyPr>
+            <a:normAutofit fontScale="92500"/>
           </a:bodyPr>
           <a:lstStyle/>
           <a:p>
-            <a:endParaRPr lang="pt-BR" dirty="0"/>
+            <a:pPr marL="0" indent="0">
+              <a:buNone/>
+            </a:pPr>
+            <a:r>
+              <a:rPr lang="pt-BR" sz="2800" dirty="0"/>
+              <a:t>“É possível distinguir dois tipos de conhecimento: o </a:t>
+            </a:r>
+            <a:r>
+              <a:rPr lang="pt-BR" sz="2800" b="1" dirty="0"/>
+              <a:t>explícito</a:t>
+            </a:r>
+            <a:r>
+              <a:rPr lang="pt-BR" sz="2800" dirty="0"/>
+              <a:t> e o </a:t>
+            </a:r>
+            <a:r>
+              <a:rPr lang="pt-BR" sz="2800" b="1" dirty="0"/>
+              <a:t>tácito</a:t>
+            </a:r>
+            <a:r>
+              <a:rPr lang="pt-BR" sz="2800" dirty="0"/>
+              <a:t>. O conhecimento explícito, ou codificado, refere-se ao conhecimento transmissível em linguagem formal, sistemática, enquanto o conhecimento tácito possui uma qualidade pessoal, tornando-se mais difícil de ser formalizado e comunicado”. - </a:t>
+            </a:r>
+            <a:r>
+              <a:rPr lang="pt-BR" sz="2800" b="1" dirty="0"/>
+              <a:t>Fleury (2002, p.139).</a:t>
+            </a:r>
           </a:p>
         </p:txBody>
       </p:sp>
     </p:spTree>
     <p:extLst>
       <p:ext uri="{BB962C8B-B14F-4D97-AF65-F5344CB8AC3E}">
-        <p14:creationId xmlns:p14="http://schemas.microsoft.com/office/powerpoint/2010/main" val="4224210779"/>
+        <p14:creationId xmlns:p14="http://schemas.microsoft.com/office/powerpoint/2010/main" val="3406512495"/>
       </p:ext>
     </p:extLst>
   </p:cSld>
@@ -6137,64 +6251,80 @@
           <a:chExt cx="0" cy="0"/>
         </a:xfrm>
       </p:grpSpPr>
-      <p:sp>
-        <p:nvSpPr>
-          <p:cNvPr id="2" name="Título 1"/>
-          <p:cNvSpPr>
-            <a:spLocks noGrp="1"/>
-          </p:cNvSpPr>
-          <p:nvPr>
-            <p:ph type="title"/>
-          </p:nvPr>
-        </p:nvSpPr>
-        <p:spPr>
-          <a:xfrm>
-            <a:off x="1599783" y="2606040"/>
-            <a:ext cx="8989258" cy="1645920"/>
-          </a:xfrm>
-        </p:spPr>
-        <p:txBody>
-          <a:bodyPr>
-            <a:normAutofit fontScale="90000"/>
-          </a:bodyPr>
-          <a:lstStyle/>
-          <a:p>
-            <a:r>
-              <a:rPr lang="pt-BR" dirty="0"/>
-              <a:t>Aprendizagem Organizacional e Vantagem Competitiva</a:t>
-            </a:r>
-          </a:p>
-        </p:txBody>
-      </p:sp>
-      <p:sp>
-        <p:nvSpPr>
-          <p:cNvPr id="4" name="Espaço Reservado para Texto 3">
+      <p:pic>
+        <p:nvPicPr>
+          <p:cNvPr id="9" name="Espaço Reservado para Conteúdo 8">
             <a:extLst>
               <a:ext uri="{FF2B5EF4-FFF2-40B4-BE49-F238E27FC236}">
-                <a16:creationId xmlns:a16="http://schemas.microsoft.com/office/drawing/2014/main" id="{0CBB9BE4-F53E-4C50-9313-C1F896D2F2C2}"/>
+                <a16:creationId xmlns:a16="http://schemas.microsoft.com/office/drawing/2014/main" id="{CC9DB16C-B653-4180-9657-D5A5FFF96D82}"/>
               </a:ext>
             </a:extLst>
           </p:cNvPr>
-          <p:cNvSpPr>
-            <a:spLocks noGrp="1"/>
-          </p:cNvSpPr>
-          <p:nvPr>
-            <p:ph type="body" idx="1"/>
-          </p:nvPr>
-        </p:nvSpPr>
-        <p:spPr/>
-        <p:txBody>
-          <a:bodyPr/>
-          <a:lstStyle/>
-          <a:p>
-            <a:endParaRPr lang="pt-BR"/>
+          <p:cNvPicPr>
+            <a:picLocks noGrp="1" noChangeAspect="1"/>
+          </p:cNvPicPr>
+          <p:nvPr>
+            <p:ph idx="1"/>
+          </p:nvPr>
+        </p:nvPicPr>
+        <p:blipFill>
+          <a:blip r:embed="rId2">
+            <a:extLst>
+              <a:ext uri="{28A0092B-C50C-407E-A947-70E740481C1C}">
+                <a14:useLocalDpi xmlns:a14="http://schemas.microsoft.com/office/drawing/2010/main" val="0"/>
+              </a:ext>
+            </a:extLst>
+          </a:blip>
+          <a:stretch>
+            <a:fillRect/>
+          </a:stretch>
+        </p:blipFill>
+        <p:spPr>
+          <a:xfrm>
+            <a:off x="2205980" y="156900"/>
+            <a:ext cx="7776864" cy="6544200"/>
+          </a:xfrm>
+          <a:effectLst>
+            <a:softEdge rad="12700"/>
+          </a:effectLst>
+        </p:spPr>
+      </p:pic>
+      <p:sp>
+        <p:nvSpPr>
+          <p:cNvPr id="10" name="CaixaDeTexto 9">
+            <a:extLst>
+              <a:ext uri="{FF2B5EF4-FFF2-40B4-BE49-F238E27FC236}">
+                <a16:creationId xmlns:a16="http://schemas.microsoft.com/office/drawing/2014/main" id="{44333704-4AE1-416B-A851-2767C4BAEB01}"/>
+              </a:ext>
+            </a:extLst>
+          </p:cNvPr>
+          <p:cNvSpPr txBox="1"/>
+          <p:nvPr/>
+        </p:nvSpPr>
+        <p:spPr>
+          <a:xfrm>
+            <a:off x="405780" y="692696"/>
+            <a:ext cx="3672408" cy="5472608"/>
+          </a:xfrm>
+          <a:prstGeom prst="rect">
+            <a:avLst/>
+          </a:prstGeom>
+          <a:noFill/>
+        </p:spPr>
+        <p:txBody>
+          <a:bodyPr wrap="square" rtlCol="0">
+            <a:spAutoFit/>
+          </a:bodyPr>
+          <a:lstStyle/>
+          <a:p>
+            <a:endParaRPr lang="pt-BR" dirty="0"/>
           </a:p>
         </p:txBody>
       </p:sp>
     </p:spTree>
     <p:extLst>
       <p:ext uri="{BB962C8B-B14F-4D97-AF65-F5344CB8AC3E}">
-        <p14:creationId xmlns:p14="http://schemas.microsoft.com/office/powerpoint/2010/main" val="320938827"/>
+        <p14:creationId xmlns:p14="http://schemas.microsoft.com/office/powerpoint/2010/main" val="4224210779"/>
       </p:ext>
     </p:extLst>
   </p:cSld>
@@ -6235,10 +6365,39 @@
       </p:grpSpPr>
       <p:sp>
         <p:nvSpPr>
-          <p:cNvPr id="5" name="Título 4">
+          <p:cNvPr id="2" name="Título 1"/>
+          <p:cNvSpPr>
+            <a:spLocks noGrp="1"/>
+          </p:cNvSpPr>
+          <p:nvPr>
+            <p:ph type="title"/>
+          </p:nvPr>
+        </p:nvSpPr>
+        <p:spPr>
+          <a:xfrm>
+            <a:off x="1599783" y="2606040"/>
+            <a:ext cx="8989258" cy="1645920"/>
+          </a:xfrm>
+        </p:spPr>
+        <p:txBody>
+          <a:bodyPr>
+            <a:normAutofit fontScale="90000"/>
+          </a:bodyPr>
+          <a:lstStyle/>
+          <a:p>
+            <a:r>
+              <a:rPr lang="pt-BR" dirty="0"/>
+              <a:t>Aprendizagem Organizacional e Vantagem Competitiva</a:t>
+            </a:r>
+          </a:p>
+        </p:txBody>
+      </p:sp>
+      <p:sp>
+        <p:nvSpPr>
+          <p:cNvPr id="4" name="Espaço Reservado para Texto 3">
             <a:extLst>
               <a:ext uri="{FF2B5EF4-FFF2-40B4-BE49-F238E27FC236}">
-                <a16:creationId xmlns:a16="http://schemas.microsoft.com/office/drawing/2014/main" id="{844E1A2C-63AB-4E9E-853D-84E072070C24}"/>
+                <a16:creationId xmlns:a16="http://schemas.microsoft.com/office/drawing/2014/main" id="{0CBB9BE4-F53E-4C50-9313-C1F896D2F2C2}"/>
               </a:ext>
             </a:extLst>
           </p:cNvPr>
@@ -6246,32 +6405,7 @@
             <a:spLocks noGrp="1"/>
           </p:cNvSpPr>
           <p:nvPr>
-            <p:ph type="title"/>
-          </p:nvPr>
-        </p:nvSpPr>
-        <p:spPr/>
-        <p:txBody>
-          <a:bodyPr/>
-          <a:lstStyle/>
-          <a:p>
-            <a:endParaRPr lang="pt-BR"/>
-          </a:p>
-        </p:txBody>
-      </p:sp>
-      <p:sp>
-        <p:nvSpPr>
-          <p:cNvPr id="6" name="Espaço Reservado para Conteúdo 5">
-            <a:extLst>
-              <a:ext uri="{FF2B5EF4-FFF2-40B4-BE49-F238E27FC236}">
-                <a16:creationId xmlns:a16="http://schemas.microsoft.com/office/drawing/2014/main" id="{A31A64BB-FC88-440A-A001-8619BA674C0F}"/>
-              </a:ext>
-            </a:extLst>
-          </p:cNvPr>
-          <p:cNvSpPr>
-            <a:spLocks noGrp="1"/>
-          </p:cNvSpPr>
-          <p:nvPr>
-            <p:ph idx="1"/>
+            <p:ph type="body" idx="1"/>
           </p:nvPr>
         </p:nvSpPr>
         <p:spPr/>
@@ -6286,7 +6420,7 @@
     </p:spTree>
     <p:extLst>
       <p:ext uri="{BB962C8B-B14F-4D97-AF65-F5344CB8AC3E}">
-        <p14:creationId xmlns:p14="http://schemas.microsoft.com/office/powerpoint/2010/main" val="4207251800"/>
+        <p14:creationId xmlns:p14="http://schemas.microsoft.com/office/powerpoint/2010/main" val="320938827"/>
       </p:ext>
     </p:extLst>
   </p:cSld>
@@ -6327,39 +6461,10 @@
       </p:grpSpPr>
       <p:sp>
         <p:nvSpPr>
-          <p:cNvPr id="2" name="Título 1"/>
-          <p:cNvSpPr>
-            <a:spLocks noGrp="1"/>
-          </p:cNvSpPr>
-          <p:nvPr>
-            <p:ph type="title"/>
-          </p:nvPr>
-        </p:nvSpPr>
-        <p:spPr>
-          <a:xfrm>
-            <a:off x="1599783" y="2119056"/>
-            <a:ext cx="8989258" cy="2619888"/>
-          </a:xfrm>
-        </p:spPr>
-        <p:txBody>
-          <a:bodyPr>
-            <a:normAutofit fontScale="90000"/>
-          </a:bodyPr>
-          <a:lstStyle/>
-          <a:p>
-            <a:r>
-              <a:rPr lang="pt-BR" sz="4800" dirty="0"/>
-              <a:t>Competição, Inovação e Estratégias em Ambientes de Rápidas Mudanças Tecnológicas.</a:t>
-            </a:r>
-          </a:p>
-        </p:txBody>
-      </p:sp>
-      <p:sp>
-        <p:nvSpPr>
-          <p:cNvPr id="4" name="Espaço Reservado para Texto 3">
+          <p:cNvPr id="5" name="Título 4">
             <a:extLst>
               <a:ext uri="{FF2B5EF4-FFF2-40B4-BE49-F238E27FC236}">
-                <a16:creationId xmlns:a16="http://schemas.microsoft.com/office/drawing/2014/main" id="{972A732D-796C-4F64-9E00-184BD54F7C4E}"/>
+                <a16:creationId xmlns:a16="http://schemas.microsoft.com/office/drawing/2014/main" id="{844E1A2C-63AB-4E9E-853D-84E072070C24}"/>
               </a:ext>
             </a:extLst>
           </p:cNvPr>
@@ -6367,7 +6472,7 @@
             <a:spLocks noGrp="1"/>
           </p:cNvSpPr>
           <p:nvPr>
-            <p:ph type="body" idx="1"/>
+            <p:ph type="title"/>
           </p:nvPr>
         </p:nvSpPr>
         <p:spPr/>
@@ -6376,13 +6481,38 @@
           <a:lstStyle/>
           <a:p>
             <a:endParaRPr lang="pt-BR"/>
+          </a:p>
+        </p:txBody>
+      </p:sp>
+      <p:sp>
+        <p:nvSpPr>
+          <p:cNvPr id="6" name="Espaço Reservado para Conteúdo 5">
+            <a:extLst>
+              <a:ext uri="{FF2B5EF4-FFF2-40B4-BE49-F238E27FC236}">
+                <a16:creationId xmlns:a16="http://schemas.microsoft.com/office/drawing/2014/main" id="{A31A64BB-FC88-440A-A001-8619BA674C0F}"/>
+              </a:ext>
+            </a:extLst>
+          </p:cNvPr>
+          <p:cNvSpPr>
+            <a:spLocks noGrp="1"/>
+          </p:cNvSpPr>
+          <p:nvPr>
+            <p:ph idx="1"/>
+          </p:nvPr>
+        </p:nvSpPr>
+        <p:spPr/>
+        <p:txBody>
+          <a:bodyPr/>
+          <a:lstStyle/>
+          <a:p>
+            <a:endParaRPr lang="pt-BR" dirty="0"/>
           </a:p>
         </p:txBody>
       </p:sp>
     </p:spTree>
     <p:extLst>
       <p:ext uri="{BB962C8B-B14F-4D97-AF65-F5344CB8AC3E}">
-        <p14:creationId xmlns:p14="http://schemas.microsoft.com/office/powerpoint/2010/main" val="3388181005"/>
+        <p14:creationId xmlns:p14="http://schemas.microsoft.com/office/powerpoint/2010/main" val="4207251800"/>
       </p:ext>
     </p:extLst>
   </p:cSld>

</xml_diff>

<commit_message>
correção da imagem de tácito
</commit_message>
<xml_diff>
--- a/PE/Estratégia e Conhecimento.pptx
+++ b/PE/Estratégia e Conhecimento.pptx
@@ -6251,12 +6251,44 @@
           <a:chExt cx="0" cy="0"/>
         </a:xfrm>
       </p:grpSpPr>
+      <p:sp>
+        <p:nvSpPr>
+          <p:cNvPr id="10" name="CaixaDeTexto 9">
+            <a:extLst>
+              <a:ext uri="{FF2B5EF4-FFF2-40B4-BE49-F238E27FC236}">
+                <a16:creationId xmlns:a16="http://schemas.microsoft.com/office/drawing/2014/main" id="{44333704-4AE1-416B-A851-2767C4BAEB01}"/>
+              </a:ext>
+            </a:extLst>
+          </p:cNvPr>
+          <p:cNvSpPr txBox="1"/>
+          <p:nvPr/>
+        </p:nvSpPr>
+        <p:spPr>
+          <a:xfrm>
+            <a:off x="405780" y="692696"/>
+            <a:ext cx="3672408" cy="5472608"/>
+          </a:xfrm>
+          <a:prstGeom prst="rect">
+            <a:avLst/>
+          </a:prstGeom>
+          <a:noFill/>
+        </p:spPr>
+        <p:txBody>
+          <a:bodyPr wrap="square" rtlCol="0">
+            <a:spAutoFit/>
+          </a:bodyPr>
+          <a:lstStyle/>
+          <a:p>
+            <a:endParaRPr lang="pt-BR" dirty="0"/>
+          </a:p>
+        </p:txBody>
+      </p:sp>
       <p:pic>
         <p:nvPicPr>
-          <p:cNvPr id="9" name="Espaço Reservado para Conteúdo 8">
+          <p:cNvPr id="5" name="Espaço Reservado para Conteúdo 4">
             <a:extLst>
               <a:ext uri="{FF2B5EF4-FFF2-40B4-BE49-F238E27FC236}">
-                <a16:creationId xmlns:a16="http://schemas.microsoft.com/office/drawing/2014/main" id="{CC9DB16C-B653-4180-9657-D5A5FFF96D82}"/>
+                <a16:creationId xmlns:a16="http://schemas.microsoft.com/office/drawing/2014/main" id="{3C245619-ADCD-45B8-A6AC-EE0CFE78DD9A}"/>
               </a:ext>
             </a:extLst>
           </p:cNvPr>
@@ -6281,46 +6313,14 @@
         </p:blipFill>
         <p:spPr>
           <a:xfrm>
-            <a:off x="2205980" y="156900"/>
-            <a:ext cx="7776864" cy="6544200"/>
+            <a:off x="2133972" y="96305"/>
+            <a:ext cx="7920880" cy="6665390"/>
           </a:xfrm>
           <a:effectLst>
             <a:softEdge rad="12700"/>
           </a:effectLst>
         </p:spPr>
       </p:pic>
-      <p:sp>
-        <p:nvSpPr>
-          <p:cNvPr id="10" name="CaixaDeTexto 9">
-            <a:extLst>
-              <a:ext uri="{FF2B5EF4-FFF2-40B4-BE49-F238E27FC236}">
-                <a16:creationId xmlns:a16="http://schemas.microsoft.com/office/drawing/2014/main" id="{44333704-4AE1-416B-A851-2767C4BAEB01}"/>
-              </a:ext>
-            </a:extLst>
-          </p:cNvPr>
-          <p:cNvSpPr txBox="1"/>
-          <p:nvPr/>
-        </p:nvSpPr>
-        <p:spPr>
-          <a:xfrm>
-            <a:off x="405780" y="692696"/>
-            <a:ext cx="3672408" cy="5472608"/>
-          </a:xfrm>
-          <a:prstGeom prst="rect">
-            <a:avLst/>
-          </a:prstGeom>
-          <a:noFill/>
-        </p:spPr>
-        <p:txBody>
-          <a:bodyPr wrap="square" rtlCol="0">
-            <a:spAutoFit/>
-          </a:bodyPr>
-          <a:lstStyle/>
-          <a:p>
-            <a:endParaRPr lang="pt-BR" dirty="0"/>
-          </a:p>
-        </p:txBody>
-      </p:sp>
     </p:spTree>
     <p:extLst>
       <p:ext uri="{BB962C8B-B14F-4D97-AF65-F5344CB8AC3E}">

</xml_diff>